<commit_message>
Actualización BAC 9 y 12
</commit_message>
<xml_diff>
--- a/HT-1/Banco-BAC-09-Metamodelo.pptx
+++ b/HT-1/Banco-BAC-09-Metamodelo.pptx
@@ -2092,10 +2092,10 @@
       </p:sp>
       <p:pic>
         <p:nvPicPr>
-          <p:cNvPr id="3" name="Imagen 2">
+          <p:cNvPr id="9" name="Imagen 8">
             <a:extLst>
               <a:ext uri="{FF2B5EF4-FFF2-40B4-BE49-F238E27FC236}">
-                <a16:creationId xmlns:a16="http://schemas.microsoft.com/office/drawing/2014/main" id="{B4D4231F-504B-CAA8-5DDE-4BDC21729BAE}"/>
+                <a16:creationId xmlns:a16="http://schemas.microsoft.com/office/drawing/2014/main" id="{9F063BF0-D441-EF0F-4357-6D45A3EDF79E}"/>
               </a:ext>
             </a:extLst>
           </p:cNvPr>
@@ -2112,8 +2112,8 @@
         </p:blipFill>
         <p:spPr>
           <a:xfrm>
-            <a:off x="4172774" y="430186"/>
-            <a:ext cx="3846449" cy="5377179"/>
+            <a:off x="4238683" y="636567"/>
+            <a:ext cx="3714631" cy="5214026"/>
           </a:xfrm>
           <a:prstGeom prst="rect">
             <a:avLst/>

</xml_diff>

<commit_message>
updates para pasarlo a un pdf
</commit_message>
<xml_diff>
--- a/HT-1/Banco-BAC-09-Metamodelo.pptx
+++ b/HT-1/Banco-BAC-09-Metamodelo.pptx
@@ -213,7 +213,7 @@
           <a:p>
             <a:fld id="{C84E95E0-43A6-4D53-BDBE-E8A6E9BC4F1E}" type="datetimeFigureOut">
               <a:rPr lang="es-ES" smtClean="0"/>
-              <a:t>14/08/2022</a:t>
+              <a:t>15/8/22</a:t>
             </a:fld>
             <a:endParaRPr lang="es-ES"/>
           </a:p>
@@ -371,7 +371,7 @@
           <a:p>
             <a:fld id="{A7ACAE50-97D0-47A2-B9C8-25667F34B8EA}" type="slidenum">
               <a:rPr lang="es-ES" smtClean="0"/>
-              <a:t>‹Nº›</a:t>
+              <a:t>‹#›</a:t>
             </a:fld>
             <a:endParaRPr lang="es-ES"/>
           </a:p>
@@ -1146,7 +1146,7 @@
             <a:fld id="{57F581D2-D2F7-4C56-ADAA-56285F38747F}" type="slidenum">
               <a:rPr lang="es-ES" smtClean="0"/>
               <a:pPr/>
-              <a:t>‹Nº›</a:t>
+              <a:t>‹#›</a:t>
             </a:fld>
             <a:endParaRPr lang="es-ES" dirty="0"/>
           </a:p>
@@ -1520,7 +1520,7 @@
           <a:p>
             <a:fld id="{57F581D2-D2F7-4C56-ADAA-56285F38747F}" type="slidenum">
               <a:rPr lang="es-ES" smtClean="0"/>
-              <a:t>‹Nº›</a:t>
+              <a:t>‹#›</a:t>
             </a:fld>
             <a:endParaRPr lang="es-ES"/>
           </a:p>
@@ -1909,7 +1909,7 @@
           <p:nvPr>
             <p:extLst>
               <p:ext uri="{D42A27DB-BD31-4B8C-83A1-F6EECF244321}">
-                <p14:modId xmlns:p14="http://schemas.microsoft.com/office/powerpoint/2010/main" val="3207900740"/>
+                <p14:modId xmlns:p14="http://schemas.microsoft.com/office/powerpoint/2010/main" val="1014898923"/>
               </p:ext>
             </p:extLst>
           </p:nvPr>
@@ -1982,7 +1982,14 @@
                           <a:latin typeface="Arial" panose="020B0604020202020204" pitchFamily="34" charset="0"/>
                           <a:cs typeface="Arial" panose="020B0604020202020204" pitchFamily="34" charset="0"/>
                         </a:rPr>
-                        <a:t>Negocio: Monopolio</a:t>
+                        <a:t>Negocio</a:t>
+                      </a:r>
+                      <a:r>
+                        <a:rPr lang="es-ES_tradnl" sz="1200">
+                          <a:latin typeface="Arial" panose="020B0604020202020204" pitchFamily="34" charset="0"/>
+                          <a:cs typeface="Arial" panose="020B0604020202020204" pitchFamily="34" charset="0"/>
+                        </a:rPr>
+                        <a:t>: Banco</a:t>
                       </a:r>
                     </a:p>
                   </a:txBody>

</xml_diff>